<commit_message>
slight mod to pres
</commit_message>
<xml_diff>
--- a/WeeklyPresentations/update10_05_26.pptx
+++ b/WeeklyPresentations/update10_05_26.pptx
@@ -3492,8 +3492,8 @@
           </a:p>
         </p:txBody>
       </p:sp>
-      <mc:AlternateContent xmlns:mc="http://schemas.openxmlformats.org/markup-compatibility/2006">
-        <mc:Choice xmlns:a14="http://schemas.microsoft.com/office/drawing/2010/main" Requires="a14">
+      <mc:AlternateContent xmlns:mc="http://schemas.openxmlformats.org/markup-compatibility/2006" xmlns:a14="http://schemas.microsoft.com/office/drawing/2010/main">
+        <mc:Choice Requires="a14">
           <p:sp>
             <p:nvSpPr>
               <p:cNvPr id="3" name="Content Placeholder 2">
@@ -3838,7 +3838,7 @@
             </p:txBody>
           </p:sp>
         </mc:Choice>
-        <mc:Fallback>
+        <mc:Fallback xmlns="">
           <p:sp>
             <p:nvSpPr>
               <p:cNvPr id="3" name="Content Placeholder 2">
@@ -6723,13 +6723,13 @@
         </p:nvSpPr>
         <p:spPr>
           <a:xfrm>
-            <a:off x="838200" y="1489166"/>
-            <a:ext cx="10515600" cy="5368834"/>
+            <a:off x="231913" y="1489166"/>
+            <a:ext cx="8504583" cy="5368834"/>
           </a:xfrm>
         </p:spPr>
         <p:txBody>
           <a:bodyPr>
-            <a:normAutofit fontScale="92500" lnSpcReduction="20000"/>
+            <a:normAutofit fontScale="85000" lnSpcReduction="20000"/>
           </a:bodyPr>
           <a:lstStyle/>
           <a:p>
@@ -6777,6 +6777,36 @@
           </a:p>
         </p:txBody>
       </p:sp>
+      <p:pic>
+        <p:nvPicPr>
+          <p:cNvPr id="4" name="Picture 3">
+            <a:extLst>
+              <a:ext uri="{FF2B5EF4-FFF2-40B4-BE49-F238E27FC236}">
+                <a16:creationId xmlns:a16="http://schemas.microsoft.com/office/drawing/2014/main" id="{086DEEC8-9D01-4082-A275-2460542B07F9}"/>
+              </a:ext>
+            </a:extLst>
+          </p:cNvPr>
+          <p:cNvPicPr>
+            <a:picLocks noChangeAspect="1"/>
+          </p:cNvPicPr>
+          <p:nvPr/>
+        </p:nvPicPr>
+        <p:blipFill>
+          <a:blip r:embed="rId2"/>
+          <a:stretch>
+            <a:fillRect/>
+          </a:stretch>
+        </p:blipFill>
+        <p:spPr>
+          <a:xfrm>
+            <a:off x="8633637" y="0"/>
+            <a:ext cx="3558363" cy="6858000"/>
+          </a:xfrm>
+          <a:prstGeom prst="rect">
+            <a:avLst/>
+          </a:prstGeom>
+        </p:spPr>
+      </p:pic>
     </p:spTree>
     <p:extLst>
       <p:ext uri="{BB962C8B-B14F-4D97-AF65-F5344CB8AC3E}">
@@ -10133,8 +10163,8 @@
           </a:p>
         </p:txBody>
       </p:sp>
-      <mc:AlternateContent xmlns:mc="http://schemas.openxmlformats.org/markup-compatibility/2006">
-        <mc:Choice xmlns:a14="http://schemas.microsoft.com/office/drawing/2010/main" Requires="a14">
+      <mc:AlternateContent xmlns:mc="http://schemas.openxmlformats.org/markup-compatibility/2006" xmlns:a14="http://schemas.microsoft.com/office/drawing/2010/main">
+        <mc:Choice Requires="a14">
           <p:sp>
             <p:nvSpPr>
               <p:cNvPr id="47" name="TextBox 46">
@@ -10163,6 +10193,7 @@
               </a:bodyPr>
               <a:lstStyle/>
               <a:p>
+                <a:pPr/>
                 <a14:m>
                   <m:oMathPara xmlns:m="http://schemas.openxmlformats.org/officeDocument/2006/math">
                     <m:oMathParaPr>
@@ -10457,7 +10488,7 @@
             </p:txBody>
           </p:sp>
         </mc:Choice>
-        <mc:Fallback>
+        <mc:Fallback xmlns="">
           <p:sp>
             <p:nvSpPr>
               <p:cNvPr id="47" name="TextBox 46">
@@ -11754,8 +11785,8 @@
           </a:p>
         </p:txBody>
       </p:sp>
-      <mc:AlternateContent xmlns:mc="http://schemas.openxmlformats.org/markup-compatibility/2006">
-        <mc:Choice xmlns:a14="http://schemas.microsoft.com/office/drawing/2010/main" Requires="a14">
+      <mc:AlternateContent xmlns:mc="http://schemas.openxmlformats.org/markup-compatibility/2006" xmlns:a14="http://schemas.microsoft.com/office/drawing/2010/main">
+        <mc:Choice Requires="a14">
           <p:sp>
             <p:nvSpPr>
               <p:cNvPr id="47" name="TextBox 46">
@@ -11784,6 +11815,7 @@
               </a:bodyPr>
               <a:lstStyle/>
               <a:p>
+                <a:pPr/>
                 <a14:m>
                   <m:oMathPara xmlns:m="http://schemas.openxmlformats.org/officeDocument/2006/math">
                     <m:oMathParaPr>
@@ -11910,7 +11942,7 @@
             </p:txBody>
           </p:sp>
         </mc:Choice>
-        <mc:Fallback>
+        <mc:Fallback xmlns="">
           <p:sp>
             <p:nvSpPr>
               <p:cNvPr id="47" name="TextBox 46">
@@ -12121,8 +12153,8 @@
           </a:p>
         </p:txBody>
       </p:sp>
-      <mc:AlternateContent xmlns:mc="http://schemas.openxmlformats.org/markup-compatibility/2006">
-        <mc:Choice xmlns:a14="http://schemas.microsoft.com/office/drawing/2010/main" Requires="a14">
+      <mc:AlternateContent xmlns:mc="http://schemas.openxmlformats.org/markup-compatibility/2006" xmlns:a14="http://schemas.microsoft.com/office/drawing/2010/main">
+        <mc:Choice Requires="a14">
           <p:sp>
             <p:nvSpPr>
               <p:cNvPr id="34" name="TextBox 33">
@@ -12151,6 +12183,7 @@
               </a:bodyPr>
               <a:lstStyle/>
               <a:p>
+                <a:pPr/>
                 <a14:m>
                   <m:oMathPara xmlns:m="http://schemas.openxmlformats.org/officeDocument/2006/math">
                     <m:oMathParaPr>
@@ -12277,7 +12310,7 @@
             </p:txBody>
           </p:sp>
         </mc:Choice>
-        <mc:Fallback>
+        <mc:Fallback xmlns="">
           <p:sp>
             <p:nvSpPr>
               <p:cNvPr id="34" name="TextBox 33">

</xml_diff>